<commit_message>
added stylistic changes to presentation
</commit_message>
<xml_diff>
--- a/GitHub Basics.pptx
+++ b/GitHub Basics.pptx
@@ -119,14 +119,6 @@
 </p:presentation>
 </file>
 
-<file path=ppt/revisionInfo.xml><?xml version="1.0" encoding="utf-8"?>
-<p1510:revInfo xmlns:a="http://schemas.openxmlformats.org/drawingml/2006/main" xmlns:r="http://schemas.openxmlformats.org/officeDocument/2006/relationships" xmlns:p1510="http://schemas.microsoft.com/office/powerpoint/2015/10/main">
-  <p1510:revLst>
-    <p1510:client id="{5982D4C3-9BDD-474F-A7FE-EADE74449EBE}" v="8" dt="2024-09-14T21:53:22.224"/>
-  </p1510:revLst>
-</p1510:revInfo>
-</file>
-
 <file path=ppt/slideLayouts/slideLayout1.xml><?xml version="1.0" encoding="utf-8"?>
 <p:sldLayout xmlns:a="http://schemas.openxmlformats.org/drawingml/2006/main" xmlns:r="http://schemas.openxmlformats.org/officeDocument/2006/relationships" xmlns:p="http://schemas.openxmlformats.org/presentationml/2006/main" type="title" preserve="1">
   <p:cSld name="Title Slide">
@@ -2760,9 +2752,33 @@
 <p:sldMaster xmlns:a="http://schemas.openxmlformats.org/drawingml/2006/main" xmlns:r="http://schemas.openxmlformats.org/officeDocument/2006/relationships" xmlns:p="http://schemas.openxmlformats.org/presentationml/2006/main">
   <p:cSld>
     <p:bg>
-      <p:bgRef idx="1001">
-        <a:schemeClr val="bg1"/>
-      </p:bgRef>
+      <p:bgPr>
+        <a:gradFill flip="none" rotWithShape="1">
+          <a:gsLst>
+            <a:gs pos="5000">
+              <a:schemeClr val="tx2"/>
+            </a:gs>
+            <a:gs pos="58000">
+              <a:schemeClr val="accent1">
+                <a:lumMod val="45000"/>
+                <a:lumOff val="55000"/>
+              </a:schemeClr>
+            </a:gs>
+            <a:gs pos="87000">
+              <a:schemeClr val="tx2">
+                <a:lumMod val="10000"/>
+                <a:lumOff val="90000"/>
+              </a:schemeClr>
+            </a:gs>
+            <a:gs pos="100000">
+              <a:schemeClr val="bg1"/>
+            </a:gs>
+          </a:gsLst>
+          <a:lin ang="5400000" scaled="1"/>
+          <a:tileRect/>
+        </a:gradFill>
+        <a:effectLst/>
+      </p:bgPr>
     </p:bg>
     <p:spTree>
       <p:nvGrpSpPr>
@@ -4912,7 +4928,7 @@
 <file path=ppt/theme/theme1.xml><?xml version="1.0" encoding="utf-8"?>
 <a:theme xmlns:a="http://schemas.openxmlformats.org/drawingml/2006/main" name="Office Theme">
   <a:themeElements>
-    <a:clrScheme name="Office">
+    <a:clrScheme name="Custom 1">
       <a:dk1>
         <a:sysClr val="windowText" lastClr="000000"/>
       </a:dk1>
@@ -4944,7 +4960,7 @@
         <a:srgbClr val="4EA72E"/>
       </a:accent6>
       <a:hlink>
-        <a:srgbClr val="467886"/>
+        <a:srgbClr val="000000"/>
       </a:hlink>
       <a:folHlink>
         <a:srgbClr val="96607D"/>

</xml_diff>